<commit_message>
make some small comment edits
</commit_message>
<xml_diff>
--- a/Fall_2024/day1/E_NonTraditionalMkts.pptx
+++ b/Fall_2024/day1/E_NonTraditionalMkts.pptx
@@ -221,7 +221,7 @@
           <a:p>
             <a:fld id="{B0C0A60C-850A-4EA4-9C14-A8FE98B94505}" type="datetimeFigureOut">
               <a:rPr lang="en-US" smtClean="0"/>
-              <a:t>10/15/24</a:t>
+              <a:t>10/30/24</a:t>
             </a:fld>
             <a:endParaRPr lang="en-US"/>
           </a:p>
@@ -791,7 +791,7 @@
           <a:p>
             <a:fld id="{5738B90E-0779-4C36-915C-6F05FCD89456}" type="datetime1">
               <a:rPr lang="en-US" smtClean="0"/>
-              <a:t>10/15/24</a:t>
+              <a:t>10/30/24</a:t>
             </a:fld>
             <a:endParaRPr lang="en-US"/>
           </a:p>
@@ -998,7 +998,7 @@
           <a:p>
             <a:fld id="{D753EFC8-4232-4598-94F6-94C0EBAFC469}" type="datetime1">
               <a:rPr lang="en-US" smtClean="0"/>
-              <a:t>10/15/24</a:t>
+              <a:t>10/30/24</a:t>
             </a:fld>
             <a:endParaRPr lang="en-US"/>
           </a:p>
@@ -1119,7 +1119,7 @@
           <a:p>
             <a:fld id="{6700A58B-DD98-43D0-B791-721480A02982}" type="datetime1">
               <a:rPr lang="en-US" smtClean="0"/>
-              <a:t>10/15/24</a:t>
+              <a:t>10/30/24</a:t>
             </a:fld>
             <a:endParaRPr lang="en-US"/>
           </a:p>
@@ -1354,7 +1354,7 @@
           <a:p>
             <a:fld id="{08437B94-E2BF-44DC-ADC5-B05FC9934E9D}" type="datetime1">
               <a:rPr lang="en-US" smtClean="0"/>
-              <a:t>10/15/24</a:t>
+              <a:t>10/30/24</a:t>
             </a:fld>
             <a:endParaRPr lang="en-US"/>
           </a:p>
@@ -1871,7 +1871,7 @@
           <a:p>
             <a:fld id="{5738B90E-0779-4C36-915C-6F05FCD89456}" type="datetime1">
               <a:rPr lang="en-US" smtClean="0"/>
-              <a:t>10/15/24</a:t>
+              <a:t>10/30/24</a:t>
             </a:fld>
             <a:endParaRPr lang="en-US"/>
           </a:p>
@@ -2005,7 +2005,7 @@
           <a:p>
             <a:fld id="{6700A58B-DD98-43D0-B791-721480A02982}" type="datetime1">
               <a:rPr lang="en-US" smtClean="0"/>
-              <a:t>10/15/24</a:t>
+              <a:t>10/30/24</a:t>
             </a:fld>
             <a:endParaRPr lang="en-US"/>
           </a:p>
@@ -2221,7 +2221,7 @@
           <a:p>
             <a:fld id="{6700A58B-DD98-43D0-B791-721480A02982}" type="datetime1">
               <a:rPr lang="en-US" smtClean="0"/>
-              <a:t>10/15/24</a:t>
+              <a:t>10/30/24</a:t>
             </a:fld>
             <a:endParaRPr lang="en-US"/>
           </a:p>
@@ -2723,7 +2723,7 @@
           <a:p>
             <a:fld id="{D753EFC8-4232-4598-94F6-94C0EBAFC469}" type="datetime1">
               <a:rPr lang="en-US" smtClean="0"/>
-              <a:t>10/15/24</a:t>
+              <a:t>10/30/24</a:t>
             </a:fld>
             <a:endParaRPr lang="en-US"/>
           </a:p>
@@ -3221,7 +3221,7 @@
           <a:p>
             <a:fld id="{6700A58B-DD98-43D0-B791-721480A02982}" type="datetime1">
               <a:rPr lang="en-US" smtClean="0"/>
-              <a:t>10/15/24</a:t>
+              <a:t>10/30/24</a:t>
             </a:fld>
             <a:endParaRPr lang="en-US"/>
           </a:p>
@@ -3382,6 +3382,42 @@
                 <a:latin typeface="__Inter_e7970e"/>
               </a:rPr>
               <a:t>This distribution is often used in simulation and modeling to represent uncertain variables when the exact distribution is unknown but assumptions can be made about its shape.</a:t>
+            </a:r>
+            <a:endParaRPr lang="en-US" dirty="0"/>
+          </a:p>
+        </p:txBody>
+      </p:sp>
+      <p:sp>
+        <p:nvSpPr>
+          <p:cNvPr id="3" name="TextBox 2">
+            <a:extLst>
+              <a:ext uri="{FF2B5EF4-FFF2-40B4-BE49-F238E27FC236}">
+                <a16:creationId xmlns:a16="http://schemas.microsoft.com/office/drawing/2014/main" id="{AD1B7B05-2AF9-32E5-3626-AD44B7C2834E}"/>
+              </a:ext>
+            </a:extLst>
+          </p:cNvPr>
+          <p:cNvSpPr txBox="1"/>
+          <p:nvPr/>
+        </p:nvSpPr>
+        <p:spPr>
+          <a:xfrm>
+            <a:off x="6616557" y="1233920"/>
+            <a:ext cx="2445250" cy="369332"/>
+          </a:xfrm>
+          <a:prstGeom prst="rect">
+            <a:avLst/>
+          </a:prstGeom>
+          <a:noFill/>
+        </p:spPr>
+        <p:txBody>
+          <a:bodyPr wrap="square" rtlCol="0">
+            <a:spAutoFit/>
+          </a:bodyPr>
+          <a:lstStyle/>
+          <a:p>
+            <a:r>
+              <a:rPr lang="en-US" dirty="0" err="1"/>
+              <a:t>zz_triangle_example.R</a:t>
             </a:r>
             <a:endParaRPr lang="en-US" dirty="0"/>
           </a:p>
@@ -3440,7 +3476,7 @@
           <a:p>
             <a:fld id="{6700A58B-DD98-43D0-B791-721480A02982}" type="datetime1">
               <a:rPr lang="en-US" smtClean="0"/>
-              <a:t>10/15/24</a:t>
+              <a:t>10/30/24</a:t>
             </a:fld>
             <a:endParaRPr lang="en-US"/>
           </a:p>
@@ -3703,7 +3739,7 @@
           <a:p>
             <a:fld id="{6700A58B-DD98-43D0-B791-721480A02982}" type="datetime1">
               <a:rPr lang="en-US" smtClean="0"/>
-              <a:t>10/15/24</a:t>
+              <a:t>10/30/24</a:t>
             </a:fld>
             <a:endParaRPr lang="en-US"/>
           </a:p>
@@ -4189,7 +4225,7 @@
           <a:p>
             <a:fld id="{6700A58B-DD98-43D0-B791-721480A02982}" type="datetime1">
               <a:rPr lang="en-US" smtClean="0"/>
-              <a:t>10/15/24</a:t>
+              <a:t>10/30/24</a:t>
             </a:fld>
             <a:endParaRPr lang="en-US"/>
           </a:p>
@@ -4344,7 +4380,7 @@
           <a:p>
             <a:fld id="{6700A58B-DD98-43D0-B791-721480A02982}" type="datetime1">
               <a:rPr lang="en-US" smtClean="0"/>
-              <a:t>10/15/24</a:t>
+              <a:t>10/30/24</a:t>
             </a:fld>
             <a:endParaRPr lang="en-US"/>
           </a:p>
@@ -4565,7 +4601,7 @@
           <a:p>
             <a:fld id="{6700A58B-DD98-43D0-B791-721480A02982}" type="datetime1">
               <a:rPr lang="en-US" smtClean="0"/>
-              <a:t>10/15/24</a:t>
+              <a:t>10/30/24</a:t>
             </a:fld>
             <a:endParaRPr lang="en-US"/>
           </a:p>
@@ -4770,7 +4806,7 @@
           <a:p>
             <a:fld id="{6700A58B-DD98-43D0-B791-721480A02982}" type="datetime1">
               <a:rPr lang="en-US" smtClean="0"/>
-              <a:t>10/15/24</a:t>
+              <a:t>10/30/24</a:t>
             </a:fld>
             <a:endParaRPr lang="en-US"/>
           </a:p>
@@ -5076,7 +5112,7 @@
           <a:p>
             <a:fld id="{6700A58B-DD98-43D0-B791-721480A02982}" type="datetime1">
               <a:rPr lang="en-US" smtClean="0"/>
-              <a:t>10/15/24</a:t>
+              <a:t>10/30/24</a:t>
             </a:fld>
             <a:endParaRPr lang="en-US"/>
           </a:p>
@@ -5435,7 +5471,7 @@
           <a:p>
             <a:fld id="{6700A58B-DD98-43D0-B791-721480A02982}" type="datetime1">
               <a:rPr lang="en-US" smtClean="0"/>
-              <a:t>10/15/24</a:t>
+              <a:t>10/30/24</a:t>
             </a:fld>
             <a:endParaRPr lang="en-US"/>
           </a:p>
@@ -5814,7 +5850,7 @@
           <a:p>
             <a:fld id="{6700A58B-DD98-43D0-B791-721480A02982}" type="datetime1">
               <a:rPr lang="en-US" smtClean="0"/>
-              <a:t>10/15/24</a:t>
+              <a:t>10/30/24</a:t>
             </a:fld>
             <a:endParaRPr lang="en-US"/>
           </a:p>

</xml_diff>